<commit_message>
uploading week 5 slides
</commit_message>
<xml_diff>
--- a/week4/CS1550_week_4_lab2_part1.pptx
+++ b/week4/CS1550_week_4_lab2_part1.pptx
@@ -248,7 +248,7 @@
           <a:p>
             <a:fld id="{4D95D8A7-C144-4175-90AA-32D1E9946B78}" type="datetimeFigureOut">
               <a:rPr lang="en-US" smtClean="0"/>
-              <a:t>2/4/19</a:t>
+              <a:t>2/12/19</a:t>
             </a:fld>
             <a:endParaRPr lang="en-US"/>
           </a:p>
@@ -413,7 +413,7 @@
           <a:p>
             <a:fld id="{80CA24C6-88B4-47A2-BA08-402EA52A6637}" type="datetimeFigureOut">
               <a:rPr lang="en-US" smtClean="0"/>
-              <a:t>2/4/19</a:t>
+              <a:t>2/12/19</a:t>
             </a:fld>
             <a:endParaRPr lang="en-US"/>
           </a:p>
@@ -809,7 +809,7 @@
           <a:p>
             <a:fld id="{0ACD6BC5-C83A-479F-AADE-A01925B5EDB4}" type="datetimeFigureOut">
               <a:rPr lang="en-US" smtClean="0"/>
-              <a:t>2/4/19</a:t>
+              <a:t>2/12/19</a:t>
             </a:fld>
             <a:endParaRPr lang="en-US"/>
           </a:p>
@@ -977,7 +977,7 @@
           <a:p>
             <a:fld id="{0ACD6BC5-C83A-479F-AADE-A01925B5EDB4}" type="datetimeFigureOut">
               <a:rPr lang="en-US" smtClean="0"/>
-              <a:t>2/4/19</a:t>
+              <a:t>2/12/19</a:t>
             </a:fld>
             <a:endParaRPr lang="en-US"/>
           </a:p>
@@ -1155,7 +1155,7 @@
           <a:p>
             <a:fld id="{0ACD6BC5-C83A-479F-AADE-A01925B5EDB4}" type="datetimeFigureOut">
               <a:rPr lang="en-US" smtClean="0"/>
-              <a:t>2/4/19</a:t>
+              <a:t>2/12/19</a:t>
             </a:fld>
             <a:endParaRPr lang="en-US"/>
           </a:p>
@@ -1323,7 +1323,7 @@
           <a:p>
             <a:fld id="{0ACD6BC5-C83A-479F-AADE-A01925B5EDB4}" type="datetimeFigureOut">
               <a:rPr lang="en-US" smtClean="0"/>
-              <a:t>2/4/19</a:t>
+              <a:t>2/12/19</a:t>
             </a:fld>
             <a:endParaRPr lang="en-US"/>
           </a:p>
@@ -1568,7 +1568,7 @@
           <a:p>
             <a:fld id="{0ACD6BC5-C83A-479F-AADE-A01925B5EDB4}" type="datetimeFigureOut">
               <a:rPr lang="en-US" smtClean="0"/>
-              <a:t>2/4/19</a:t>
+              <a:t>2/12/19</a:t>
             </a:fld>
             <a:endParaRPr lang="en-US"/>
           </a:p>
@@ -1797,7 +1797,7 @@
           <a:p>
             <a:fld id="{0ACD6BC5-C83A-479F-AADE-A01925B5EDB4}" type="datetimeFigureOut">
               <a:rPr lang="en-US" smtClean="0"/>
-              <a:t>2/4/19</a:t>
+              <a:t>2/12/19</a:t>
             </a:fld>
             <a:endParaRPr lang="en-US"/>
           </a:p>
@@ -2161,7 +2161,7 @@
           <a:p>
             <a:fld id="{0ACD6BC5-C83A-479F-AADE-A01925B5EDB4}" type="datetimeFigureOut">
               <a:rPr lang="en-US" smtClean="0"/>
-              <a:t>2/4/19</a:t>
+              <a:t>2/12/19</a:t>
             </a:fld>
             <a:endParaRPr lang="en-US"/>
           </a:p>
@@ -2278,7 +2278,7 @@
           <a:p>
             <a:fld id="{0ACD6BC5-C83A-479F-AADE-A01925B5EDB4}" type="datetimeFigureOut">
               <a:rPr lang="en-US" smtClean="0"/>
-              <a:t>2/4/19</a:t>
+              <a:t>2/12/19</a:t>
             </a:fld>
             <a:endParaRPr lang="en-US"/>
           </a:p>
@@ -2373,7 +2373,7 @@
           <a:p>
             <a:fld id="{0ACD6BC5-C83A-479F-AADE-A01925B5EDB4}" type="datetimeFigureOut">
               <a:rPr lang="en-US" smtClean="0"/>
-              <a:t>2/4/19</a:t>
+              <a:t>2/12/19</a:t>
             </a:fld>
             <a:endParaRPr lang="en-US"/>
           </a:p>
@@ -2648,7 +2648,7 @@
           <a:p>
             <a:fld id="{0ACD6BC5-C83A-479F-AADE-A01925B5EDB4}" type="datetimeFigureOut">
               <a:rPr lang="en-US" smtClean="0"/>
-              <a:t>2/4/19</a:t>
+              <a:t>2/12/19</a:t>
             </a:fld>
             <a:endParaRPr lang="en-US"/>
           </a:p>
@@ -2900,7 +2900,7 @@
           <a:p>
             <a:fld id="{0ACD6BC5-C83A-479F-AADE-A01925B5EDB4}" type="datetimeFigureOut">
               <a:rPr lang="en-US" smtClean="0"/>
-              <a:t>2/4/19</a:t>
+              <a:t>2/12/19</a:t>
             </a:fld>
             <a:endParaRPr lang="en-US"/>
           </a:p>
@@ -3111,7 +3111,7 @@
           <a:p>
             <a:fld id="{0ACD6BC5-C83A-479F-AADE-A01925B5EDB4}" type="datetimeFigureOut">
               <a:rPr lang="en-US" smtClean="0"/>
-              <a:t>2/4/19</a:t>
+              <a:t>2/12/19</a:t>
             </a:fld>
             <a:endParaRPr lang="en-US"/>
           </a:p>
@@ -3567,7 +3567,7 @@
           <a:p>
             <a:r>
               <a:rPr lang="en-US" dirty="0"/>
-              <a:t>Week 5 – Synchronization with xv6</a:t>
+              <a:t>Week 4 – Synchronization with xv6</a:t>
             </a:r>
           </a:p>
           <a:p>
@@ -26613,8 +26613,12 @@
           <a:lstStyle/>
           <a:p>
             <a:r>
-              <a:rPr lang="en-US" dirty="0"/>
-              <a:t>Week 5 – Synchronization with xv6</a:t>
+              <a:rPr lang="en-US"/>
+              <a:t>Week 4 </a:t>
+            </a:r>
+            <a:r>
+              <a:rPr lang="en-US" dirty="0"/>
+              <a:t>– Synchronization with xv6</a:t>
             </a:r>
           </a:p>
           <a:p>

</xml_diff>